<commit_message>
Finished module 4 slides. Updates to module 3
</commit_message>
<xml_diff>
--- a/Slides/Module 3 - Web workers.pptx
+++ b/Slides/Module 3 - Web workers.pptx
@@ -20,15 +20,15 @@
     <p:sldId id="287" r:id="rId11"/>
     <p:sldId id="286" r:id="rId12"/>
     <p:sldId id="294" r:id="rId13"/>
-    <p:sldId id="292" r:id="rId14"/>
-    <p:sldId id="279" r:id="rId15"/>
-    <p:sldId id="280" r:id="rId16"/>
-    <p:sldId id="281" r:id="rId17"/>
-    <p:sldId id="282" r:id="rId18"/>
-    <p:sldId id="293" r:id="rId19"/>
-    <p:sldId id="288" r:id="rId20"/>
-    <p:sldId id="289" r:id="rId21"/>
-    <p:sldId id="290" r:id="rId22"/>
+    <p:sldId id="293" r:id="rId14"/>
+    <p:sldId id="288" r:id="rId15"/>
+    <p:sldId id="289" r:id="rId16"/>
+    <p:sldId id="290" r:id="rId17"/>
+    <p:sldId id="292" r:id="rId18"/>
+    <p:sldId id="279" r:id="rId19"/>
+    <p:sldId id="280" r:id="rId20"/>
+    <p:sldId id="281" r:id="rId21"/>
+    <p:sldId id="282" r:id="rId22"/>
     <p:sldId id="269" r:id="rId23"/>
   </p:sldIdLst>
   <p:sldSz cx="12192000" cy="6858000"/>
@@ -221,7 +221,7 @@
           <a:p>
             <a:fld id="{312E7B4A-039C-48A2-9B2C-AF16AA3873D8}" type="datetimeFigureOut">
               <a:rPr lang="en-US" smtClean="0"/>
-              <a:t>10/20/2015</a:t>
+              <a:t>10/27/2015</a:t>
             </a:fld>
             <a:endParaRPr lang="en-US"/>
           </a:p>
@@ -386,7 +386,7 @@
           <a:p>
             <a:fld id="{DA005A0C-54D9-45AA-87D4-C551D08DFCE1}" type="datetimeFigureOut">
               <a:rPr lang="en-US" smtClean="0"/>
-              <a:t>10/20/2015</a:t>
+              <a:t>10/27/2015</a:t>
             </a:fld>
             <a:endParaRPr lang="en-US"/>
           </a:p>
@@ -1419,7 +1419,7 @@
           <a:p>
             <a:fld id="{C6179893-613C-432E-9537-151564F52AA2}" type="datetimeFigureOut">
               <a:rPr lang="en-US" smtClean="0"/>
-              <a:t>10/20/2015</a:t>
+              <a:t>10/27/2015</a:t>
             </a:fld>
             <a:endParaRPr lang="en-US"/>
           </a:p>
@@ -3906,15 +3906,7 @@
             <a:pPr marL="914400" indent="-914400"/>
             <a:r>
               <a:rPr lang="en-US" dirty="0" smtClean="0"/>
-              <a:t>03 </a:t>
-            </a:r>
-            <a:r>
-              <a:rPr lang="en-US" dirty="0" smtClean="0"/>
-              <a:t>| </a:t>
-            </a:r>
-            <a:r>
-              <a:rPr lang="en-US" dirty="0" smtClean="0"/>
-              <a:t>Web Workers</a:t>
+              <a:t>03 | Web Workers</a:t>
             </a:r>
             <a:endParaRPr lang="en-US" dirty="0"/>
           </a:p>
@@ -3993,7 +3985,7 @@
           <a:p>
             <a:r>
               <a:rPr lang="en-US" dirty="0" smtClean="0"/>
-              <a:t>jQuery Promises</a:t>
+              <a:t>jQuery Deferred</a:t>
             </a:r>
             <a:endParaRPr lang="en-US" dirty="0"/>
           </a:p>
@@ -4021,7 +4013,7 @@
     </p:spTree>
     <p:extLst>
       <p:ext uri="{BB962C8B-B14F-4D97-AF65-F5344CB8AC3E}">
-        <p14:creationId xmlns:p14="http://schemas.microsoft.com/office/powerpoint/2010/main" val="1799002758"/>
+        <p14:creationId xmlns:p14="http://schemas.microsoft.com/office/powerpoint/2010/main" val="3017243009"/>
       </p:ext>
     </p:extLst>
   </p:cSld>
@@ -4050,523 +4042,6 @@
       </p:grpSpPr>
       <p:sp>
         <p:nvSpPr>
-          <p:cNvPr id="4" name="Title 3"/>
-          <p:cNvSpPr>
-            <a:spLocks noGrp="1"/>
-          </p:cNvSpPr>
-          <p:nvPr>
-            <p:ph type="title"/>
-          </p:nvPr>
-        </p:nvSpPr>
-        <p:spPr/>
-        <p:txBody>
-          <a:bodyPr/>
-          <a:lstStyle/>
-          <a:p>
-            <a:r>
-              <a:rPr lang="en-US" dirty="0" smtClean="0"/>
-              <a:t>Asynchronous programming</a:t>
-            </a:r>
-            <a:endParaRPr lang="en-US" dirty="0"/>
-          </a:p>
-        </p:txBody>
-      </p:sp>
-      <p:sp>
-        <p:nvSpPr>
-          <p:cNvPr id="5" name="Content Placeholder 4"/>
-          <p:cNvSpPr>
-            <a:spLocks noGrp="1"/>
-          </p:cNvSpPr>
-          <p:nvPr>
-            <p:ph sz="quarter" idx="10"/>
-          </p:nvPr>
-        </p:nvSpPr>
-        <p:spPr>
-          <a:prstGeom prst="rect">
-            <a:avLst/>
-          </a:prstGeom>
-        </p:spPr>
-        <p:txBody>
-          <a:bodyPr/>
-          <a:lstStyle/>
-          <a:p>
-            <a:r>
-              <a:rPr lang="en-US" dirty="0" smtClean="0"/>
-              <a:t>Certain operations can take an unknown amount of time</a:t>
-            </a:r>
-          </a:p>
-          <a:p>
-            <a:pPr lvl="1"/>
-            <a:r>
-              <a:rPr lang="en-US" dirty="0" smtClean="0"/>
-              <a:t>Making server calls</a:t>
-            </a:r>
-          </a:p>
-          <a:p>
-            <a:pPr lvl="1"/>
-            <a:r>
-              <a:rPr lang="en-US" dirty="0" smtClean="0"/>
-              <a:t>Working with graphics</a:t>
-            </a:r>
-          </a:p>
-          <a:p>
-            <a:r>
-              <a:rPr lang="en-US" dirty="0" smtClean="0"/>
-              <a:t>Certain operations perform at unknown times</a:t>
-            </a:r>
-          </a:p>
-          <a:p>
-            <a:pPr lvl="1"/>
-            <a:r>
-              <a:rPr lang="en-US" dirty="0" smtClean="0"/>
-              <a:t>Timed events</a:t>
-            </a:r>
-          </a:p>
-          <a:p>
-            <a:pPr lvl="1"/>
-            <a:r>
-              <a:rPr lang="en-US" dirty="0" smtClean="0"/>
-              <a:t>Web sockets</a:t>
-            </a:r>
-          </a:p>
-          <a:p>
-            <a:endParaRPr lang="en-US" dirty="0"/>
-          </a:p>
-          <a:p>
-            <a:r>
-              <a:rPr lang="en-US" dirty="0" smtClean="0"/>
-              <a:t>Asynchronous programming allows us to manage those situations</a:t>
-            </a:r>
-            <a:endParaRPr lang="en-US" dirty="0"/>
-          </a:p>
-        </p:txBody>
-      </p:sp>
-    </p:spTree>
-    <p:extLst>
-      <p:ext uri="{BB962C8B-B14F-4D97-AF65-F5344CB8AC3E}">
-        <p14:creationId xmlns:p14="http://schemas.microsoft.com/office/powerpoint/2010/main" val="1291475549"/>
-      </p:ext>
-    </p:extLst>
-  </p:cSld>
-  <p:clrMapOvr>
-    <a:masterClrMapping/>
-  </p:clrMapOvr>
-  <p:timing>
-    <p:tnLst>
-      <p:par>
-        <p:cTn id="1" dur="indefinite" restart="never" nodeType="tmRoot"/>
-      </p:par>
-    </p:tnLst>
-  </p:timing>
-</p:sld>
-</file>
-
-<file path=ppt/slides/slide12.xml><?xml version="1.0" encoding="utf-8"?>
-<p:sld xmlns:a="http://schemas.openxmlformats.org/drawingml/2006/main" xmlns:r="http://schemas.openxmlformats.org/officeDocument/2006/relationships" xmlns:p="http://schemas.openxmlformats.org/presentationml/2006/main">
-  <p:cSld>
-    <p:spTree>
-      <p:nvGrpSpPr>
-        <p:cNvPr id="1" name=""/>
-        <p:cNvGrpSpPr/>
-        <p:nvPr/>
-      </p:nvGrpSpPr>
-      <p:grpSpPr>
-        <a:xfrm>
-          <a:off x="0" y="0"/>
-          <a:ext cx="0" cy="0"/>
-          <a:chOff x="0" y="0"/>
-          <a:chExt cx="0" cy="0"/>
-        </a:xfrm>
-      </p:grpSpPr>
-      <p:sp>
-        <p:nvSpPr>
-          <p:cNvPr id="2" name="Title 1"/>
-          <p:cNvSpPr>
-            <a:spLocks noGrp="1"/>
-          </p:cNvSpPr>
-          <p:nvPr>
-            <p:ph type="title"/>
-          </p:nvPr>
-        </p:nvSpPr>
-        <p:spPr/>
-        <p:txBody>
-          <a:bodyPr>
-            <a:normAutofit fontScale="90000"/>
-          </a:bodyPr>
-          <a:lstStyle/>
-          <a:p>
-            <a:r>
-              <a:rPr lang="en-US" dirty="0" smtClean="0"/>
-              <a:t>jQuery Promise</a:t>
-            </a:r>
-            <a:br>
-              <a:rPr lang="en-US" dirty="0" smtClean="0"/>
-            </a:br>
-            <a:r>
-              <a:rPr lang="en-US" dirty="0" smtClean="0"/>
-              <a:t>object</a:t>
-            </a:r>
-            <a:endParaRPr lang="en-US" dirty="0"/>
-          </a:p>
-        </p:txBody>
-      </p:sp>
-      <p:sp>
-        <p:nvSpPr>
-          <p:cNvPr id="3" name="Content Placeholder 2"/>
-          <p:cNvSpPr>
-            <a:spLocks noGrp="1"/>
-          </p:cNvSpPr>
-          <p:nvPr>
-            <p:ph sz="quarter" idx="10"/>
-          </p:nvPr>
-        </p:nvSpPr>
-        <p:spPr>
-          <a:prstGeom prst="rect">
-            <a:avLst/>
-          </a:prstGeom>
-        </p:spPr>
-        <p:txBody>
-          <a:bodyPr/>
-          <a:lstStyle/>
-          <a:p>
-            <a:r>
-              <a:rPr lang="en-US" dirty="0" smtClean="0"/>
-              <a:t>jQuery Promise is an implementation of the promise pattern</a:t>
-            </a:r>
-          </a:p>
-          <a:p>
-            <a:endParaRPr lang="en-US" dirty="0"/>
-          </a:p>
-          <a:p>
-            <a:r>
-              <a:rPr lang="en-US" dirty="0" smtClean="0"/>
-              <a:t>Put simply, the promise pattern allows a developer to register event handlers for various events or states</a:t>
-            </a:r>
-          </a:p>
-          <a:p>
-            <a:pPr lvl="1"/>
-            <a:r>
-              <a:rPr lang="en-US" dirty="0" smtClean="0"/>
-              <a:t>Failed</a:t>
-            </a:r>
-          </a:p>
-          <a:p>
-            <a:pPr lvl="1"/>
-            <a:r>
-              <a:rPr lang="en-US" dirty="0" smtClean="0"/>
-              <a:t>Succeeded</a:t>
-            </a:r>
-          </a:p>
-          <a:p>
-            <a:pPr lvl="1"/>
-            <a:r>
-              <a:rPr lang="en-US" dirty="0" smtClean="0"/>
-              <a:t>In progress</a:t>
-            </a:r>
-            <a:endParaRPr lang="en-US" dirty="0"/>
-          </a:p>
-        </p:txBody>
-      </p:sp>
-    </p:spTree>
-    <p:extLst>
-      <p:ext uri="{BB962C8B-B14F-4D97-AF65-F5344CB8AC3E}">
-        <p14:creationId xmlns:p14="http://schemas.microsoft.com/office/powerpoint/2010/main" val="3741816926"/>
-      </p:ext>
-    </p:extLst>
-  </p:cSld>
-  <p:clrMapOvr>
-    <a:masterClrMapping/>
-  </p:clrMapOvr>
-  <p:timing>
-    <p:tnLst>
-      <p:par>
-        <p:cTn id="1" dur="indefinite" restart="never" nodeType="tmRoot"/>
-      </p:par>
-    </p:tnLst>
-  </p:timing>
-</p:sld>
-</file>
-
-<file path=ppt/slides/slide13.xml><?xml version="1.0" encoding="utf-8"?>
-<p:sld xmlns:a="http://schemas.openxmlformats.org/drawingml/2006/main" xmlns:r="http://schemas.openxmlformats.org/officeDocument/2006/relationships" xmlns:p="http://schemas.openxmlformats.org/presentationml/2006/main">
-  <p:cSld>
-    <p:spTree>
-      <p:nvGrpSpPr>
-        <p:cNvPr id="1" name=""/>
-        <p:cNvGrpSpPr/>
-        <p:nvPr/>
-      </p:nvGrpSpPr>
-      <p:grpSpPr>
-        <a:xfrm>
-          <a:off x="0" y="0"/>
-          <a:ext cx="0" cy="0"/>
-          <a:chOff x="0" y="0"/>
-          <a:chExt cx="0" cy="0"/>
-        </a:xfrm>
-      </p:grpSpPr>
-      <p:sp>
-        <p:nvSpPr>
-          <p:cNvPr id="2" name="Title 1"/>
-          <p:cNvSpPr>
-            <a:spLocks noGrp="1"/>
-          </p:cNvSpPr>
-          <p:nvPr>
-            <p:ph type="title"/>
-          </p:nvPr>
-        </p:nvSpPr>
-        <p:spPr/>
-        <p:txBody>
-          <a:bodyPr/>
-          <a:lstStyle/>
-          <a:p>
-            <a:r>
-              <a:rPr lang="en-US" dirty="0" smtClean="0"/>
-              <a:t>Three common Promise events</a:t>
-            </a:r>
-            <a:endParaRPr lang="en-US" dirty="0"/>
-          </a:p>
-        </p:txBody>
-      </p:sp>
-      <p:sp>
-        <p:nvSpPr>
-          <p:cNvPr id="3" name="Content Placeholder 2"/>
-          <p:cNvSpPr>
-            <a:spLocks noGrp="1"/>
-          </p:cNvSpPr>
-          <p:nvPr>
-            <p:ph sz="quarter" idx="10"/>
-          </p:nvPr>
-        </p:nvSpPr>
-        <p:spPr>
-          <a:prstGeom prst="rect">
-            <a:avLst/>
-          </a:prstGeom>
-        </p:spPr>
-        <p:txBody>
-          <a:bodyPr/>
-          <a:lstStyle/>
-          <a:p>
-            <a:r>
-              <a:rPr lang="en-US" b="1" dirty="0" smtClean="0">
-                <a:latin typeface="Consolas" panose="020B0609020204030204" pitchFamily="49" charset="0"/>
-                <a:cs typeface="Consolas" panose="020B0609020204030204" pitchFamily="49" charset="0"/>
-              </a:rPr>
-              <a:t>done</a:t>
-            </a:r>
-          </a:p>
-          <a:p>
-            <a:pPr lvl="1"/>
-            <a:r>
-              <a:rPr lang="en-US" dirty="0" smtClean="0"/>
-              <a:t>Operation has completed successfully</a:t>
-            </a:r>
-          </a:p>
-          <a:p>
-            <a:r>
-              <a:rPr lang="en-US" b="1" dirty="0">
-                <a:latin typeface="Consolas" panose="020B0609020204030204" pitchFamily="49" charset="0"/>
-                <a:cs typeface="Consolas" panose="020B0609020204030204" pitchFamily="49" charset="0"/>
-              </a:rPr>
-              <a:t>fail</a:t>
-            </a:r>
-          </a:p>
-          <a:p>
-            <a:pPr lvl="1"/>
-            <a:r>
-              <a:rPr lang="en-US" dirty="0" smtClean="0"/>
-              <a:t>Operation has completed unsuccessfully</a:t>
-            </a:r>
-          </a:p>
-          <a:p>
-            <a:r>
-              <a:rPr lang="en-US" b="1" dirty="0">
-                <a:latin typeface="Consolas" panose="020B0609020204030204" pitchFamily="49" charset="0"/>
-                <a:cs typeface="Consolas" panose="020B0609020204030204" pitchFamily="49" charset="0"/>
-              </a:rPr>
-              <a:t>progress</a:t>
-            </a:r>
-          </a:p>
-          <a:p>
-            <a:pPr lvl="1"/>
-            <a:r>
-              <a:rPr lang="en-US" dirty="0" smtClean="0"/>
-              <a:t>Operation has reported a progress update</a:t>
-            </a:r>
-            <a:endParaRPr lang="en-US" dirty="0"/>
-          </a:p>
-        </p:txBody>
-      </p:sp>
-    </p:spTree>
-    <p:extLst>
-      <p:ext uri="{BB962C8B-B14F-4D97-AF65-F5344CB8AC3E}">
-        <p14:creationId xmlns:p14="http://schemas.microsoft.com/office/powerpoint/2010/main" val="1188221039"/>
-      </p:ext>
-    </p:extLst>
-  </p:cSld>
-  <p:clrMapOvr>
-    <a:masterClrMapping/>
-  </p:clrMapOvr>
-  <p:timing>
-    <p:tnLst>
-      <p:par>
-        <p:cTn id="1" dur="indefinite" restart="never" nodeType="tmRoot"/>
-      </p:par>
-    </p:tnLst>
-  </p:timing>
-</p:sld>
-</file>
-
-<file path=ppt/slides/slide14.xml><?xml version="1.0" encoding="utf-8"?>
-<p:sld xmlns:a="http://schemas.openxmlformats.org/drawingml/2006/main" xmlns:r="http://schemas.openxmlformats.org/officeDocument/2006/relationships" xmlns:p="http://schemas.openxmlformats.org/presentationml/2006/main">
-  <p:cSld>
-    <p:spTree>
-      <p:nvGrpSpPr>
-        <p:cNvPr id="1" name=""/>
-        <p:cNvGrpSpPr/>
-        <p:nvPr/>
-      </p:nvGrpSpPr>
-      <p:grpSpPr>
-        <a:xfrm>
-          <a:off x="0" y="0"/>
-          <a:ext cx="0" cy="0"/>
-          <a:chOff x="0" y="0"/>
-          <a:chExt cx="0" cy="0"/>
-        </a:xfrm>
-      </p:grpSpPr>
-      <p:sp>
-        <p:nvSpPr>
-          <p:cNvPr id="2" name="Title 1"/>
-          <p:cNvSpPr>
-            <a:spLocks noGrp="1"/>
-          </p:cNvSpPr>
-          <p:nvPr>
-            <p:ph type="title"/>
-          </p:nvPr>
-        </p:nvSpPr>
-        <p:spPr/>
-        <p:txBody>
-          <a:bodyPr/>
-          <a:lstStyle/>
-          <a:p>
-            <a:r>
-              <a:rPr lang="en-US" dirty="0" smtClean="0"/>
-              <a:t>jQuery Promises</a:t>
-            </a:r>
-            <a:endParaRPr lang="en-US" dirty="0"/>
-          </a:p>
-        </p:txBody>
-      </p:sp>
-    </p:spTree>
-    <p:extLst>
-      <p:ext uri="{BB962C8B-B14F-4D97-AF65-F5344CB8AC3E}">
-        <p14:creationId xmlns:p14="http://schemas.microsoft.com/office/powerpoint/2010/main" val="3011397667"/>
-      </p:ext>
-    </p:extLst>
-  </p:cSld>
-  <p:clrMapOvr>
-    <a:masterClrMapping/>
-  </p:clrMapOvr>
-  <p:timing>
-    <p:tnLst>
-      <p:par>
-        <p:cTn id="1" dur="indefinite" restart="never" nodeType="tmRoot"/>
-      </p:par>
-    </p:tnLst>
-  </p:timing>
-</p:sld>
-</file>
-
-<file path=ppt/slides/slide15.xml><?xml version="1.0" encoding="utf-8"?>
-<p:sld xmlns:a="http://schemas.openxmlformats.org/drawingml/2006/main" xmlns:r="http://schemas.openxmlformats.org/officeDocument/2006/relationships" xmlns:p="http://schemas.openxmlformats.org/presentationml/2006/main">
-  <p:cSld>
-    <p:spTree>
-      <p:nvGrpSpPr>
-        <p:cNvPr id="1" name=""/>
-        <p:cNvGrpSpPr/>
-        <p:nvPr/>
-      </p:nvGrpSpPr>
-      <p:grpSpPr>
-        <a:xfrm>
-          <a:off x="0" y="0"/>
-          <a:ext cx="0" cy="0"/>
-          <a:chOff x="0" y="0"/>
-          <a:chExt cx="0" cy="0"/>
-        </a:xfrm>
-      </p:grpSpPr>
-      <p:sp>
-        <p:nvSpPr>
-          <p:cNvPr id="4" name="Text Placeholder 3"/>
-          <p:cNvSpPr>
-            <a:spLocks noGrp="1"/>
-          </p:cNvSpPr>
-          <p:nvPr>
-            <p:ph type="body" sz="quarter" idx="10"/>
-          </p:nvPr>
-        </p:nvSpPr>
-        <p:spPr/>
-        <p:txBody>
-          <a:bodyPr/>
-          <a:lstStyle/>
-          <a:p>
-            <a:r>
-              <a:rPr lang="en-US" dirty="0" smtClean="0"/>
-              <a:t>jQuery Deferred</a:t>
-            </a:r>
-            <a:endParaRPr lang="en-US" dirty="0"/>
-          </a:p>
-        </p:txBody>
-      </p:sp>
-      <p:sp>
-        <p:nvSpPr>
-          <p:cNvPr id="3" name="Subtitle 2"/>
-          <p:cNvSpPr>
-            <a:spLocks noGrp="1"/>
-          </p:cNvSpPr>
-          <p:nvPr>
-            <p:ph type="subTitle" idx="1"/>
-          </p:nvPr>
-        </p:nvSpPr>
-        <p:spPr/>
-        <p:txBody>
-          <a:bodyPr/>
-          <a:lstStyle/>
-          <a:p>
-            <a:endParaRPr lang="en-US"/>
-          </a:p>
-        </p:txBody>
-      </p:sp>
-    </p:spTree>
-    <p:extLst>
-      <p:ext uri="{BB962C8B-B14F-4D97-AF65-F5344CB8AC3E}">
-        <p14:creationId xmlns:p14="http://schemas.microsoft.com/office/powerpoint/2010/main" val="3017243009"/>
-      </p:ext>
-    </p:extLst>
-  </p:cSld>
-  <p:clrMapOvr>
-    <a:masterClrMapping/>
-  </p:clrMapOvr>
-</p:sld>
-</file>
-
-<file path=ppt/slides/slide16.xml><?xml version="1.0" encoding="utf-8"?>
-<p:sld xmlns:a="http://schemas.openxmlformats.org/drawingml/2006/main" xmlns:r="http://schemas.openxmlformats.org/officeDocument/2006/relationships" xmlns:p="http://schemas.openxmlformats.org/presentationml/2006/main">
-  <p:cSld>
-    <p:spTree>
-      <p:nvGrpSpPr>
-        <p:cNvPr id="1" name=""/>
-        <p:cNvGrpSpPr/>
-        <p:nvPr/>
-      </p:nvGrpSpPr>
-      <p:grpSpPr>
-        <a:xfrm>
-          <a:off x="0" y="0"/>
-          <a:ext cx="0" cy="0"/>
-          <a:chOff x="0" y="0"/>
-          <a:chExt cx="0" cy="0"/>
-        </a:xfrm>
-      </p:grpSpPr>
-      <p:sp>
-        <p:nvSpPr>
           <p:cNvPr id="3" name="Title 2"/>
           <p:cNvSpPr>
             <a:spLocks noGrp="1"/>
@@ -4658,7 +4133,7 @@
 </p:sld>
 </file>
 
-<file path=ppt/slides/slide17.xml><?xml version="1.0" encoding="utf-8"?>
+<file path=ppt/slides/slide12.xml><?xml version="1.0" encoding="utf-8"?>
 <p:sld xmlns:a="http://schemas.openxmlformats.org/drawingml/2006/main" xmlns:r="http://schemas.openxmlformats.org/officeDocument/2006/relationships" xmlns:p="http://schemas.openxmlformats.org/presentationml/2006/main">
   <p:cSld>
     <p:spTree>
@@ -5346,6 +4821,527 @@
 </p:sld>
 </file>
 
+<file path=ppt/slides/slide13.xml><?xml version="1.0" encoding="utf-8"?>
+<p:sld xmlns:a="http://schemas.openxmlformats.org/drawingml/2006/main" xmlns:r="http://schemas.openxmlformats.org/officeDocument/2006/relationships" xmlns:p="http://schemas.openxmlformats.org/presentationml/2006/main">
+  <p:cSld>
+    <p:spTree>
+      <p:nvGrpSpPr>
+        <p:cNvPr id="1" name=""/>
+        <p:cNvGrpSpPr/>
+        <p:nvPr/>
+      </p:nvGrpSpPr>
+      <p:grpSpPr>
+        <a:xfrm>
+          <a:off x="0" y="0"/>
+          <a:ext cx="0" cy="0"/>
+          <a:chOff x="0" y="0"/>
+          <a:chExt cx="0" cy="0"/>
+        </a:xfrm>
+      </p:grpSpPr>
+      <p:sp>
+        <p:nvSpPr>
+          <p:cNvPr id="2" name="Title 1"/>
+          <p:cNvSpPr>
+            <a:spLocks noGrp="1"/>
+          </p:cNvSpPr>
+          <p:nvPr>
+            <p:ph type="title"/>
+          </p:nvPr>
+        </p:nvSpPr>
+        <p:spPr/>
+        <p:txBody>
+          <a:bodyPr/>
+          <a:lstStyle/>
+          <a:p>
+            <a:r>
+              <a:rPr lang="en-US" dirty="0"/>
+              <a:t>Using the deferred </a:t>
+            </a:r>
+            <a:r>
+              <a:rPr lang="en-US" dirty="0" smtClean="0"/>
+              <a:t>object</a:t>
+            </a:r>
+            <a:endParaRPr lang="en-US" dirty="0"/>
+          </a:p>
+        </p:txBody>
+      </p:sp>
+    </p:spTree>
+    <p:extLst>
+      <p:ext uri="{BB962C8B-B14F-4D97-AF65-F5344CB8AC3E}">
+        <p14:creationId xmlns:p14="http://schemas.microsoft.com/office/powerpoint/2010/main" val="606120277"/>
+      </p:ext>
+    </p:extLst>
+  </p:cSld>
+  <p:clrMapOvr>
+    <a:masterClrMapping/>
+  </p:clrMapOvr>
+  <p:timing>
+    <p:tnLst>
+      <p:par>
+        <p:cTn id="1" dur="indefinite" restart="never" nodeType="tmRoot"/>
+      </p:par>
+    </p:tnLst>
+  </p:timing>
+</p:sld>
+</file>
+
+<file path=ppt/slides/slide14.xml><?xml version="1.0" encoding="utf-8"?>
+<p:sld xmlns:a="http://schemas.openxmlformats.org/drawingml/2006/main" xmlns:r="http://schemas.openxmlformats.org/officeDocument/2006/relationships" xmlns:p="http://schemas.openxmlformats.org/presentationml/2006/main">
+  <p:cSld>
+    <p:spTree>
+      <p:nvGrpSpPr>
+        <p:cNvPr id="1" name=""/>
+        <p:cNvGrpSpPr/>
+        <p:nvPr/>
+      </p:nvGrpSpPr>
+      <p:grpSpPr>
+        <a:xfrm>
+          <a:off x="0" y="0"/>
+          <a:ext cx="0" cy="0"/>
+          <a:chOff x="0" y="0"/>
+          <a:chExt cx="0" cy="0"/>
+        </a:xfrm>
+      </p:grpSpPr>
+      <p:sp>
+        <p:nvSpPr>
+          <p:cNvPr id="4" name="Text Placeholder 3"/>
+          <p:cNvSpPr>
+            <a:spLocks noGrp="1"/>
+          </p:cNvSpPr>
+          <p:nvPr>
+            <p:ph type="body" sz="quarter" idx="10"/>
+          </p:nvPr>
+        </p:nvSpPr>
+        <p:spPr/>
+        <p:txBody>
+          <a:bodyPr/>
+          <a:lstStyle/>
+          <a:p>
+            <a:r>
+              <a:rPr lang="en-US" dirty="0" smtClean="0"/>
+              <a:t>jQuery Promises</a:t>
+            </a:r>
+            <a:endParaRPr lang="en-US" dirty="0"/>
+          </a:p>
+        </p:txBody>
+      </p:sp>
+      <p:sp>
+        <p:nvSpPr>
+          <p:cNvPr id="3" name="Subtitle 2"/>
+          <p:cNvSpPr>
+            <a:spLocks noGrp="1"/>
+          </p:cNvSpPr>
+          <p:nvPr>
+            <p:ph type="subTitle" idx="1"/>
+          </p:nvPr>
+        </p:nvSpPr>
+        <p:spPr/>
+        <p:txBody>
+          <a:bodyPr/>
+          <a:lstStyle/>
+          <a:p>
+            <a:endParaRPr lang="en-US"/>
+          </a:p>
+        </p:txBody>
+      </p:sp>
+    </p:spTree>
+    <p:extLst>
+      <p:ext uri="{BB962C8B-B14F-4D97-AF65-F5344CB8AC3E}">
+        <p14:creationId xmlns:p14="http://schemas.microsoft.com/office/powerpoint/2010/main" val="1799002758"/>
+      </p:ext>
+    </p:extLst>
+  </p:cSld>
+  <p:clrMapOvr>
+    <a:masterClrMapping/>
+  </p:clrMapOvr>
+</p:sld>
+</file>
+
+<file path=ppt/slides/slide15.xml><?xml version="1.0" encoding="utf-8"?>
+<p:sld xmlns:a="http://schemas.openxmlformats.org/drawingml/2006/main" xmlns:r="http://schemas.openxmlformats.org/officeDocument/2006/relationships" xmlns:p="http://schemas.openxmlformats.org/presentationml/2006/main">
+  <p:cSld>
+    <p:spTree>
+      <p:nvGrpSpPr>
+        <p:cNvPr id="1" name=""/>
+        <p:cNvGrpSpPr/>
+        <p:nvPr/>
+      </p:nvGrpSpPr>
+      <p:grpSpPr>
+        <a:xfrm>
+          <a:off x="0" y="0"/>
+          <a:ext cx="0" cy="0"/>
+          <a:chOff x="0" y="0"/>
+          <a:chExt cx="0" cy="0"/>
+        </a:xfrm>
+      </p:grpSpPr>
+      <p:sp>
+        <p:nvSpPr>
+          <p:cNvPr id="4" name="Title 3"/>
+          <p:cNvSpPr>
+            <a:spLocks noGrp="1"/>
+          </p:cNvSpPr>
+          <p:nvPr>
+            <p:ph type="title"/>
+          </p:nvPr>
+        </p:nvSpPr>
+        <p:spPr/>
+        <p:txBody>
+          <a:bodyPr/>
+          <a:lstStyle/>
+          <a:p>
+            <a:r>
+              <a:rPr lang="en-US" dirty="0" smtClean="0"/>
+              <a:t>Asynchronous programming</a:t>
+            </a:r>
+            <a:endParaRPr lang="en-US" dirty="0"/>
+          </a:p>
+        </p:txBody>
+      </p:sp>
+      <p:sp>
+        <p:nvSpPr>
+          <p:cNvPr id="5" name="Content Placeholder 4"/>
+          <p:cNvSpPr>
+            <a:spLocks noGrp="1"/>
+          </p:cNvSpPr>
+          <p:nvPr>
+            <p:ph sz="quarter" idx="10"/>
+          </p:nvPr>
+        </p:nvSpPr>
+        <p:spPr>
+          <a:prstGeom prst="rect">
+            <a:avLst/>
+          </a:prstGeom>
+        </p:spPr>
+        <p:txBody>
+          <a:bodyPr/>
+          <a:lstStyle/>
+          <a:p>
+            <a:r>
+              <a:rPr lang="en-US" dirty="0" smtClean="0"/>
+              <a:t>Certain operations can take an unknown amount of time</a:t>
+            </a:r>
+          </a:p>
+          <a:p>
+            <a:pPr lvl="1"/>
+            <a:r>
+              <a:rPr lang="en-US" dirty="0" smtClean="0"/>
+              <a:t>Making server calls</a:t>
+            </a:r>
+          </a:p>
+          <a:p>
+            <a:pPr lvl="1"/>
+            <a:r>
+              <a:rPr lang="en-US" dirty="0" smtClean="0"/>
+              <a:t>Working with graphics</a:t>
+            </a:r>
+          </a:p>
+          <a:p>
+            <a:r>
+              <a:rPr lang="en-US" dirty="0" smtClean="0"/>
+              <a:t>Certain operations perform at unknown times</a:t>
+            </a:r>
+          </a:p>
+          <a:p>
+            <a:pPr lvl="1"/>
+            <a:r>
+              <a:rPr lang="en-US" dirty="0" smtClean="0"/>
+              <a:t>Timed events</a:t>
+            </a:r>
+          </a:p>
+          <a:p>
+            <a:pPr lvl="1"/>
+            <a:r>
+              <a:rPr lang="en-US" dirty="0" smtClean="0"/>
+              <a:t>Web sockets</a:t>
+            </a:r>
+          </a:p>
+          <a:p>
+            <a:endParaRPr lang="en-US" dirty="0"/>
+          </a:p>
+          <a:p>
+            <a:r>
+              <a:rPr lang="en-US" dirty="0" smtClean="0"/>
+              <a:t>Asynchronous programming allows us to manage those situations</a:t>
+            </a:r>
+            <a:endParaRPr lang="en-US" dirty="0"/>
+          </a:p>
+        </p:txBody>
+      </p:sp>
+    </p:spTree>
+    <p:extLst>
+      <p:ext uri="{BB962C8B-B14F-4D97-AF65-F5344CB8AC3E}">
+        <p14:creationId xmlns:p14="http://schemas.microsoft.com/office/powerpoint/2010/main" val="1291475549"/>
+      </p:ext>
+    </p:extLst>
+  </p:cSld>
+  <p:clrMapOvr>
+    <a:masterClrMapping/>
+  </p:clrMapOvr>
+  <p:timing>
+    <p:tnLst>
+      <p:par>
+        <p:cTn id="1" dur="indefinite" restart="never" nodeType="tmRoot"/>
+      </p:par>
+    </p:tnLst>
+  </p:timing>
+</p:sld>
+</file>
+
+<file path=ppt/slides/slide16.xml><?xml version="1.0" encoding="utf-8"?>
+<p:sld xmlns:a="http://schemas.openxmlformats.org/drawingml/2006/main" xmlns:r="http://schemas.openxmlformats.org/officeDocument/2006/relationships" xmlns:p="http://schemas.openxmlformats.org/presentationml/2006/main">
+  <p:cSld>
+    <p:spTree>
+      <p:nvGrpSpPr>
+        <p:cNvPr id="1" name=""/>
+        <p:cNvGrpSpPr/>
+        <p:nvPr/>
+      </p:nvGrpSpPr>
+      <p:grpSpPr>
+        <a:xfrm>
+          <a:off x="0" y="0"/>
+          <a:ext cx="0" cy="0"/>
+          <a:chOff x="0" y="0"/>
+          <a:chExt cx="0" cy="0"/>
+        </a:xfrm>
+      </p:grpSpPr>
+      <p:sp>
+        <p:nvSpPr>
+          <p:cNvPr id="2" name="Title 1"/>
+          <p:cNvSpPr>
+            <a:spLocks noGrp="1"/>
+          </p:cNvSpPr>
+          <p:nvPr>
+            <p:ph type="title"/>
+          </p:nvPr>
+        </p:nvSpPr>
+        <p:spPr/>
+        <p:txBody>
+          <a:bodyPr>
+            <a:normAutofit fontScale="90000"/>
+          </a:bodyPr>
+          <a:lstStyle/>
+          <a:p>
+            <a:r>
+              <a:rPr lang="en-US" dirty="0" smtClean="0"/>
+              <a:t>jQuery Promise</a:t>
+            </a:r>
+            <a:br>
+              <a:rPr lang="en-US" dirty="0" smtClean="0"/>
+            </a:br>
+            <a:r>
+              <a:rPr lang="en-US" dirty="0" smtClean="0"/>
+              <a:t>object</a:t>
+            </a:r>
+            <a:endParaRPr lang="en-US" dirty="0"/>
+          </a:p>
+        </p:txBody>
+      </p:sp>
+      <p:sp>
+        <p:nvSpPr>
+          <p:cNvPr id="3" name="Content Placeholder 2"/>
+          <p:cNvSpPr>
+            <a:spLocks noGrp="1"/>
+          </p:cNvSpPr>
+          <p:nvPr>
+            <p:ph sz="quarter" idx="10"/>
+          </p:nvPr>
+        </p:nvSpPr>
+        <p:spPr>
+          <a:prstGeom prst="rect">
+            <a:avLst/>
+          </a:prstGeom>
+        </p:spPr>
+        <p:txBody>
+          <a:bodyPr/>
+          <a:lstStyle/>
+          <a:p>
+            <a:r>
+              <a:rPr lang="en-US" dirty="0" smtClean="0"/>
+              <a:t>jQuery Promise is an implementation of the promise pattern</a:t>
+            </a:r>
+          </a:p>
+          <a:p>
+            <a:endParaRPr lang="en-US" dirty="0"/>
+          </a:p>
+          <a:p>
+            <a:r>
+              <a:rPr lang="en-US" dirty="0" smtClean="0"/>
+              <a:t>Put simply, the promise pattern allows a developer to register event handlers for various events or states</a:t>
+            </a:r>
+          </a:p>
+          <a:p>
+            <a:pPr lvl="1"/>
+            <a:r>
+              <a:rPr lang="en-US" dirty="0" smtClean="0"/>
+              <a:t>Failed</a:t>
+            </a:r>
+          </a:p>
+          <a:p>
+            <a:pPr lvl="1"/>
+            <a:r>
+              <a:rPr lang="en-US" dirty="0" smtClean="0"/>
+              <a:t>Succeeded</a:t>
+            </a:r>
+          </a:p>
+          <a:p>
+            <a:pPr lvl="1"/>
+            <a:r>
+              <a:rPr lang="en-US" dirty="0" smtClean="0"/>
+              <a:t>In progress</a:t>
+            </a:r>
+            <a:endParaRPr lang="en-US" dirty="0"/>
+          </a:p>
+        </p:txBody>
+      </p:sp>
+    </p:spTree>
+    <p:extLst>
+      <p:ext uri="{BB962C8B-B14F-4D97-AF65-F5344CB8AC3E}">
+        <p14:creationId xmlns:p14="http://schemas.microsoft.com/office/powerpoint/2010/main" val="3741816926"/>
+      </p:ext>
+    </p:extLst>
+  </p:cSld>
+  <p:clrMapOvr>
+    <a:masterClrMapping/>
+  </p:clrMapOvr>
+  <p:timing>
+    <p:tnLst>
+      <p:par>
+        <p:cTn id="1" dur="indefinite" restart="never" nodeType="tmRoot"/>
+      </p:par>
+    </p:tnLst>
+  </p:timing>
+</p:sld>
+</file>
+
+<file path=ppt/slides/slide17.xml><?xml version="1.0" encoding="utf-8"?>
+<p:sld xmlns:a="http://schemas.openxmlformats.org/drawingml/2006/main" xmlns:r="http://schemas.openxmlformats.org/officeDocument/2006/relationships" xmlns:p="http://schemas.openxmlformats.org/presentationml/2006/main">
+  <p:cSld>
+    <p:spTree>
+      <p:nvGrpSpPr>
+        <p:cNvPr id="1" name=""/>
+        <p:cNvGrpSpPr/>
+        <p:nvPr/>
+      </p:nvGrpSpPr>
+      <p:grpSpPr>
+        <a:xfrm>
+          <a:off x="0" y="0"/>
+          <a:ext cx="0" cy="0"/>
+          <a:chOff x="0" y="0"/>
+          <a:chExt cx="0" cy="0"/>
+        </a:xfrm>
+      </p:grpSpPr>
+      <p:sp>
+        <p:nvSpPr>
+          <p:cNvPr id="2" name="Title 1"/>
+          <p:cNvSpPr>
+            <a:spLocks noGrp="1"/>
+          </p:cNvSpPr>
+          <p:nvPr>
+            <p:ph type="title"/>
+          </p:nvPr>
+        </p:nvSpPr>
+        <p:spPr/>
+        <p:txBody>
+          <a:bodyPr/>
+          <a:lstStyle/>
+          <a:p>
+            <a:r>
+              <a:rPr lang="en-US" dirty="0" smtClean="0"/>
+              <a:t>Three common Promise events</a:t>
+            </a:r>
+            <a:endParaRPr lang="en-US" dirty="0"/>
+          </a:p>
+        </p:txBody>
+      </p:sp>
+      <p:sp>
+        <p:nvSpPr>
+          <p:cNvPr id="3" name="Content Placeholder 2"/>
+          <p:cNvSpPr>
+            <a:spLocks noGrp="1"/>
+          </p:cNvSpPr>
+          <p:nvPr>
+            <p:ph sz="quarter" idx="10"/>
+          </p:nvPr>
+        </p:nvSpPr>
+        <p:spPr>
+          <a:prstGeom prst="rect">
+            <a:avLst/>
+          </a:prstGeom>
+        </p:spPr>
+        <p:txBody>
+          <a:bodyPr/>
+          <a:lstStyle/>
+          <a:p>
+            <a:r>
+              <a:rPr lang="en-US" b="1" dirty="0" smtClean="0">
+                <a:latin typeface="Consolas" panose="020B0609020204030204" pitchFamily="49" charset="0"/>
+                <a:cs typeface="Consolas" panose="020B0609020204030204" pitchFamily="49" charset="0"/>
+              </a:rPr>
+              <a:t>done</a:t>
+            </a:r>
+          </a:p>
+          <a:p>
+            <a:pPr lvl="1"/>
+            <a:r>
+              <a:rPr lang="en-US" dirty="0" smtClean="0"/>
+              <a:t>Operation has completed successfully</a:t>
+            </a:r>
+          </a:p>
+          <a:p>
+            <a:r>
+              <a:rPr lang="en-US" b="1" dirty="0">
+                <a:latin typeface="Consolas" panose="020B0609020204030204" pitchFamily="49" charset="0"/>
+                <a:cs typeface="Consolas" panose="020B0609020204030204" pitchFamily="49" charset="0"/>
+              </a:rPr>
+              <a:t>fail</a:t>
+            </a:r>
+          </a:p>
+          <a:p>
+            <a:pPr lvl="1"/>
+            <a:r>
+              <a:rPr lang="en-US" dirty="0" smtClean="0"/>
+              <a:t>Operation has completed unsuccessfully</a:t>
+            </a:r>
+          </a:p>
+          <a:p>
+            <a:r>
+              <a:rPr lang="en-US" b="1" dirty="0">
+                <a:latin typeface="Consolas" panose="020B0609020204030204" pitchFamily="49" charset="0"/>
+                <a:cs typeface="Consolas" panose="020B0609020204030204" pitchFamily="49" charset="0"/>
+              </a:rPr>
+              <a:t>progress</a:t>
+            </a:r>
+          </a:p>
+          <a:p>
+            <a:pPr lvl="1"/>
+            <a:r>
+              <a:rPr lang="en-US" dirty="0" smtClean="0"/>
+              <a:t>Operation has reported a progress update</a:t>
+            </a:r>
+            <a:endParaRPr lang="en-US" dirty="0"/>
+          </a:p>
+        </p:txBody>
+      </p:sp>
+    </p:spTree>
+    <p:extLst>
+      <p:ext uri="{BB962C8B-B14F-4D97-AF65-F5344CB8AC3E}">
+        <p14:creationId xmlns:p14="http://schemas.microsoft.com/office/powerpoint/2010/main" val="1188221039"/>
+      </p:ext>
+    </p:extLst>
+  </p:cSld>
+  <p:clrMapOvr>
+    <a:masterClrMapping/>
+  </p:clrMapOvr>
+  <p:timing>
+    <p:tnLst>
+      <p:par>
+        <p:cTn id="1" dur="indefinite" restart="never" nodeType="tmRoot"/>
+      </p:par>
+    </p:tnLst>
+  </p:timing>
+</p:sld>
+</file>
+
 <file path=ppt/slides/slide18.xml><?xml version="1.0" encoding="utf-8"?>
 <p:sld xmlns:a="http://schemas.openxmlformats.org/drawingml/2006/main" xmlns:r="http://schemas.openxmlformats.org/officeDocument/2006/relationships" xmlns:p="http://schemas.openxmlformats.org/presentationml/2006/main">
   <p:cSld>
@@ -5379,12 +5375,8 @@
           <a:lstStyle/>
           <a:p>
             <a:r>
-              <a:rPr lang="en-US" dirty="0"/>
-              <a:t>Using the deferred </a:t>
-            </a:r>
-            <a:r>
-              <a:rPr lang="en-US" dirty="0" smtClean="0"/>
-              <a:t>object</a:t>
+              <a:rPr lang="en-US" dirty="0" smtClean="0"/>
+              <a:t>jQuery Promises</a:t>
             </a:r>
             <a:endParaRPr lang="en-US" dirty="0"/>
           </a:p>
@@ -5393,7 +5385,7 @@
     </p:spTree>
     <p:extLst>
       <p:ext uri="{BB962C8B-B14F-4D97-AF65-F5344CB8AC3E}">
-        <p14:creationId xmlns:p14="http://schemas.microsoft.com/office/powerpoint/2010/main" val="606120277"/>
+        <p14:creationId xmlns:p14="http://schemas.microsoft.com/office/powerpoint/2010/main" val="3011397667"/>
       </p:ext>
     </p:extLst>
   </p:cSld>
@@ -6629,7 +6621,15 @@
           <a:p>
             <a:r>
               <a:rPr lang="en-US" dirty="0" smtClean="0"/>
-              <a:t>Web workers can pass any JSON object</a:t>
+              <a:t>Web workers can pass any </a:t>
+            </a:r>
+            <a:r>
+              <a:rPr lang="en-US" dirty="0" smtClean="0"/>
+              <a:t>JSON/JavaScript </a:t>
+            </a:r>
+            <a:r>
+              <a:rPr lang="en-US" dirty="0" smtClean="0"/>
+              <a:t>object</a:t>
             </a:r>
           </a:p>
           <a:p>
@@ -7741,18 +7741,18 @@
 </file>
 
 <file path=customXml/item2.xml><?xml version="1.0" encoding="utf-8"?>
-<p:properties xmlns:p="http://schemas.microsoft.com/office/2006/metadata/properties" xmlns:xsi="http://www.w3.org/2001/XMLSchema-instance" xmlns:pc="http://schemas.microsoft.com/office/infopath/2007/PartnerControls">
-  <documentManagement/>
-</p:properties>
-</file>
-
-<file path=customXml/item3.xml><?xml version="1.0" encoding="utf-8"?>
 <?mso-contentType ?>
 <FormTemplates xmlns="http://schemas.microsoft.com/sharepoint/v3/contenttype/forms">
   <Display>DocumentLibraryForm</Display>
   <Edit>DocumentLibraryForm</Edit>
   <New>DocumentLibraryForm</New>
 </FormTemplates>
+</file>
+
+<file path=customXml/item3.xml><?xml version="1.0" encoding="utf-8"?>
+<p:properties xmlns:p="http://schemas.microsoft.com/office/2006/metadata/properties" xmlns:xsi="http://www.w3.org/2001/XMLSchema-instance" xmlns:pc="http://schemas.microsoft.com/office/infopath/2007/PartnerControls">
+  <documentManagement/>
+</p:properties>
 </file>
 
 <file path=customXml/itemProps1.xml><?xml version="1.0" encoding="utf-8"?>
@@ -7774,6 +7774,14 @@
 </file>
 
 <file path=customXml/itemProps2.xml><?xml version="1.0" encoding="utf-8"?>
+<ds:datastoreItem xmlns:ds="http://schemas.openxmlformats.org/officeDocument/2006/customXml" ds:itemID="{B0CA13EC-1D3C-4D6F-8D1C-E8A452CFC79A}">
+  <ds:schemaRefs>
+    <ds:schemaRef ds:uri="http://schemas.microsoft.com/sharepoint/v3/contenttype/forms"/>
+  </ds:schemaRefs>
+</ds:datastoreItem>
+</file>
+
+<file path=customXml/itemProps3.xml><?xml version="1.0" encoding="utf-8"?>
 <ds:datastoreItem xmlns:ds="http://schemas.openxmlformats.org/officeDocument/2006/customXml" ds:itemID="{7025FDD9-4C58-4084-9F89-0E6ADD6FFF55}">
   <ds:schemaRefs>
     <ds:schemaRef ds:uri="http://purl.org/dc/terms/"/>
@@ -7787,12 +7795,4 @@
     <ds:schemaRef ds:uri="http://purl.org/dc/dcmitype/"/>
   </ds:schemaRefs>
 </ds:datastoreItem>
-</file>
-
-<file path=customXml/itemProps3.xml><?xml version="1.0" encoding="utf-8"?>
-<ds:datastoreItem xmlns:ds="http://schemas.openxmlformats.org/officeDocument/2006/customXml" ds:itemID="{B0CA13EC-1D3C-4D6F-8D1C-E8A452CFC79A}">
-  <ds:schemaRefs>
-    <ds:schemaRef ds:uri="http://schemas.microsoft.com/sharepoint/v3/contenttype/forms"/>
-  </ds:schemaRefs>
-</ds:datastoreItem>
 </file>
</xml_diff>